<commit_message>
Finish slide + add dummy data
</commit_message>
<xml_diff>
--- a/docs/resources/Presentation.pptx
+++ b/docs/resources/Presentation.pptx
@@ -278,7 +278,7 @@
           <a:p>
             <a:fld id="{FBA972DB-F795-481F-9DDB-E98EB1FB6476}" type="datetimeFigureOut">
               <a:rPr lang="en-US" smtClean="0"/>
-              <a:t>12/13/2018</a:t>
+              <a:t>12/14/2018</a:t>
             </a:fld>
             <a:endParaRPr lang="en-US"/>
           </a:p>
@@ -9464,484 +9464,6 @@
               </a:rPr>
               <a:t>	</a:t>
             </a:r>
-            <a:endParaRPr lang="en-US" b="1" baseline="0" dirty="0" smtClean="0"/>
-          </a:p>
-          <a:p>
-            <a:r>
-              <a:rPr lang="en-US" b="1" baseline="0" dirty="0" smtClean="0"/>
-              <a:t>IONIC: </a:t>
-            </a:r>
-            <a:r>
-              <a:rPr lang="en-US" baseline="0" dirty="0" smtClean="0"/>
-              <a:t>	- </a:t>
-            </a:r>
-            <a:r>
-              <a:rPr lang="vi-VN" sz="1200" b="0" i="0" kern="1200" dirty="0" smtClean="0">
-                <a:solidFill>
-                  <a:schemeClr val="tx1"/>
-                </a:solidFill>
-                <a:effectLst/>
-                <a:latin typeface="+mn-lt"/>
-                <a:ea typeface="+mn-ea"/>
-                <a:cs typeface="+mn-cs"/>
-              </a:rPr>
-              <a:t>là một framework dùng để phát triển ứng dụng </a:t>
-            </a:r>
-            <a:r>
-              <a:rPr lang="en-US" sz="1200" b="0" i="0" kern="1200" dirty="0" smtClean="0">
-                <a:solidFill>
-                  <a:schemeClr val="tx1"/>
-                </a:solidFill>
-                <a:effectLst/>
-                <a:latin typeface="+mn-lt"/>
-                <a:ea typeface="+mn-ea"/>
-                <a:cs typeface="+mn-cs"/>
-              </a:rPr>
-              <a:t>di </a:t>
-            </a:r>
-            <a:r>
-              <a:rPr lang="en-US" sz="1200" b="0" i="0" kern="1200" dirty="0" err="1" smtClean="0">
-                <a:solidFill>
-                  <a:schemeClr val="tx1"/>
-                </a:solidFill>
-                <a:effectLst/>
-                <a:latin typeface="+mn-lt"/>
-                <a:ea typeface="+mn-ea"/>
-                <a:cs typeface="+mn-cs"/>
-              </a:rPr>
-              <a:t>động</a:t>
-            </a:r>
-            <a:r>
-              <a:rPr lang="en-US" sz="1200" b="0" i="0" kern="1200" dirty="0" smtClean="0">
-                <a:solidFill>
-                  <a:schemeClr val="tx1"/>
-                </a:solidFill>
-                <a:effectLst/>
-                <a:latin typeface="+mn-lt"/>
-                <a:ea typeface="+mn-ea"/>
-                <a:cs typeface="+mn-cs"/>
-              </a:rPr>
-              <a:t> hybrid (</a:t>
-            </a:r>
-            <a:r>
-              <a:rPr lang="en-US" sz="1200" b="0" i="0" kern="1200" dirty="0" err="1" smtClean="0">
-                <a:solidFill>
-                  <a:schemeClr val="tx1"/>
-                </a:solidFill>
-                <a:effectLst/>
-                <a:latin typeface="+mn-lt"/>
-                <a:ea typeface="+mn-ea"/>
-                <a:cs typeface="+mn-cs"/>
-              </a:rPr>
-              <a:t>kết</a:t>
-            </a:r>
-            <a:r>
-              <a:rPr lang="en-US" sz="1200" b="0" i="0" kern="1200" baseline="0" dirty="0" smtClean="0">
-                <a:solidFill>
-                  <a:schemeClr val="tx1"/>
-                </a:solidFill>
-                <a:effectLst/>
-                <a:latin typeface="+mn-lt"/>
-                <a:ea typeface="+mn-ea"/>
-                <a:cs typeface="+mn-cs"/>
-              </a:rPr>
-              <a:t> </a:t>
-            </a:r>
-            <a:r>
-              <a:rPr lang="en-US" sz="1200" b="0" i="0" kern="1200" baseline="0" dirty="0" err="1" smtClean="0">
-                <a:solidFill>
-                  <a:schemeClr val="tx1"/>
-                </a:solidFill>
-                <a:effectLst/>
-                <a:latin typeface="+mn-lt"/>
-                <a:ea typeface="+mn-ea"/>
-                <a:cs typeface="+mn-cs"/>
-              </a:rPr>
-              <a:t>hợp</a:t>
-            </a:r>
-            <a:r>
-              <a:rPr lang="en-US" sz="1200" b="0" i="0" kern="1200" baseline="0" dirty="0" smtClean="0">
-                <a:solidFill>
-                  <a:schemeClr val="tx1"/>
-                </a:solidFill>
-                <a:effectLst/>
-                <a:latin typeface="+mn-lt"/>
-                <a:ea typeface="+mn-ea"/>
-                <a:cs typeface="+mn-cs"/>
-              </a:rPr>
-              <a:t> </a:t>
-            </a:r>
-            <a:r>
-              <a:rPr lang="en-US" sz="1200" b="0" i="0" kern="1200" baseline="0" dirty="0" err="1" smtClean="0">
-                <a:solidFill>
-                  <a:schemeClr val="tx1"/>
-                </a:solidFill>
-                <a:effectLst/>
-                <a:latin typeface="+mn-lt"/>
-                <a:ea typeface="+mn-ea"/>
-                <a:cs typeface="+mn-cs"/>
-              </a:rPr>
-              <a:t>giữa</a:t>
-            </a:r>
-            <a:r>
-              <a:rPr lang="en-US" sz="1200" b="0" i="0" kern="1200" baseline="0" dirty="0" smtClean="0">
-                <a:solidFill>
-                  <a:schemeClr val="tx1"/>
-                </a:solidFill>
-                <a:effectLst/>
-                <a:latin typeface="+mn-lt"/>
-                <a:ea typeface="+mn-ea"/>
-                <a:cs typeface="+mn-cs"/>
-              </a:rPr>
-              <a:t> </a:t>
-            </a:r>
-            <a:r>
-              <a:rPr lang="en-US" sz="1200" b="1" i="0" kern="1200" dirty="0" smtClean="0">
-                <a:solidFill>
-                  <a:schemeClr val="tx1"/>
-                </a:solidFill>
-                <a:effectLst/>
-                <a:latin typeface="+mn-lt"/>
-                <a:ea typeface="+mn-ea"/>
-                <a:cs typeface="+mn-cs"/>
-              </a:rPr>
-              <a:t>Native app </a:t>
-            </a:r>
-            <a:r>
-              <a:rPr lang="en-US" sz="1200" b="1" i="0" kern="1200" dirty="0" err="1" smtClean="0">
-                <a:solidFill>
-                  <a:schemeClr val="tx1"/>
-                </a:solidFill>
-                <a:effectLst/>
-                <a:latin typeface="+mn-lt"/>
-                <a:ea typeface="+mn-ea"/>
-                <a:cs typeface="+mn-cs"/>
-              </a:rPr>
-              <a:t>và</a:t>
-            </a:r>
-            <a:r>
-              <a:rPr lang="en-US" sz="1200" b="1" i="0" kern="1200" dirty="0" smtClean="0">
-                <a:solidFill>
-                  <a:schemeClr val="tx1"/>
-                </a:solidFill>
-                <a:effectLst/>
-                <a:latin typeface="+mn-lt"/>
-                <a:ea typeface="+mn-ea"/>
-                <a:cs typeface="+mn-cs"/>
-              </a:rPr>
-              <a:t> Mobile </a:t>
-            </a:r>
-            <a:r>
-              <a:rPr lang="en-US" sz="1200" b="1" i="0" kern="1200" dirty="0" err="1" smtClean="0">
-                <a:solidFill>
-                  <a:schemeClr val="tx1"/>
-                </a:solidFill>
-                <a:effectLst/>
-                <a:latin typeface="+mn-lt"/>
-                <a:ea typeface="+mn-ea"/>
-                <a:cs typeface="+mn-cs"/>
-              </a:rPr>
-              <a:t>webapp</a:t>
-            </a:r>
-            <a:r>
-              <a:rPr lang="en-US" sz="1200" b="1" i="0" kern="1200" dirty="0" smtClean="0">
-                <a:solidFill>
-                  <a:schemeClr val="tx1"/>
-                </a:solidFill>
-                <a:effectLst/>
-                <a:latin typeface="+mn-lt"/>
-                <a:ea typeface="+mn-ea"/>
-                <a:cs typeface="+mn-cs"/>
-              </a:rPr>
-              <a:t>)</a:t>
-            </a:r>
-            <a:r>
-              <a:rPr lang="en-US" sz="1200" b="0" i="0" kern="1200" baseline="0" dirty="0" smtClean="0">
-                <a:solidFill>
-                  <a:schemeClr val="tx1"/>
-                </a:solidFill>
-                <a:effectLst/>
-                <a:latin typeface="+mn-lt"/>
-                <a:ea typeface="+mn-ea"/>
-                <a:cs typeface="+mn-cs"/>
-              </a:rPr>
-              <a:t>,</a:t>
-            </a:r>
-          </a:p>
-          <a:p>
-            <a:r>
-              <a:rPr lang="en-US" sz="1200" b="0" i="0" kern="1200" baseline="0" dirty="0" smtClean="0">
-                <a:solidFill>
-                  <a:schemeClr val="tx1"/>
-                </a:solidFill>
-                <a:effectLst/>
-                <a:latin typeface="+mn-lt"/>
-                <a:ea typeface="+mn-ea"/>
-                <a:cs typeface="+mn-cs"/>
-              </a:rPr>
-              <a:t>	- </a:t>
-            </a:r>
-            <a:r>
-              <a:rPr lang="vi-VN" sz="1200" b="0" i="0" kern="1200" dirty="0" smtClean="0">
-                <a:solidFill>
-                  <a:schemeClr val="tx1"/>
-                </a:solidFill>
-                <a:effectLst/>
-                <a:latin typeface="+mn-lt"/>
-                <a:ea typeface="+mn-ea"/>
-                <a:cs typeface="+mn-cs"/>
-              </a:rPr>
-              <a:t>được xây dựng bằng các công nghệ phát triển web như HTML5, CSS, JavaScript </a:t>
-            </a:r>
-            <a:endParaRPr lang="en-US" sz="1200" b="0" i="0" kern="1200" dirty="0" smtClean="0">
-              <a:solidFill>
-                <a:schemeClr val="tx1"/>
-              </a:solidFill>
-              <a:effectLst/>
-              <a:latin typeface="+mn-lt"/>
-              <a:ea typeface="+mn-ea"/>
-              <a:cs typeface="+mn-cs"/>
-            </a:endParaRPr>
-          </a:p>
-          <a:p>
-            <a:r>
-              <a:rPr lang="en-US" sz="1200" b="0" i="0" kern="1200" dirty="0" smtClean="0">
-                <a:solidFill>
-                  <a:schemeClr val="tx1"/>
-                </a:solidFill>
-                <a:effectLst/>
-                <a:latin typeface="+mn-lt"/>
-                <a:ea typeface="+mn-ea"/>
-                <a:cs typeface="+mn-cs"/>
-              </a:rPr>
-              <a:t>	- ƯU</a:t>
-            </a:r>
-            <a:r>
-              <a:rPr lang="en-US" sz="1200" b="0" i="0" kern="1200" baseline="0" dirty="0" smtClean="0">
-                <a:solidFill>
-                  <a:schemeClr val="tx1"/>
-                </a:solidFill>
-                <a:effectLst/>
-                <a:latin typeface="+mn-lt"/>
-                <a:ea typeface="+mn-ea"/>
-                <a:cs typeface="+mn-cs"/>
-              </a:rPr>
-              <a:t> ĐIỂM:</a:t>
-            </a:r>
-          </a:p>
-          <a:p>
-            <a:r>
-              <a:rPr lang="en-US" sz="1200" b="0" i="0" kern="1200" baseline="0" dirty="0" smtClean="0">
-                <a:solidFill>
-                  <a:schemeClr val="tx1"/>
-                </a:solidFill>
-                <a:effectLst/>
-                <a:latin typeface="+mn-lt"/>
-                <a:ea typeface="+mn-ea"/>
-                <a:cs typeface="+mn-cs"/>
-              </a:rPr>
-              <a:t>	+ K</a:t>
-            </a:r>
-            <a:r>
-              <a:rPr lang="vi-VN" sz="1200" b="0" i="0" kern="1200" dirty="0" smtClean="0">
-                <a:solidFill>
-                  <a:schemeClr val="tx1"/>
-                </a:solidFill>
-                <a:effectLst/>
-                <a:latin typeface="+mn-lt"/>
-                <a:ea typeface="+mn-ea"/>
-                <a:cs typeface="+mn-cs"/>
-              </a:rPr>
-              <a:t>hả năng hiển thị nội dung trên tất cả các thiết bị di động</a:t>
-            </a:r>
-            <a:endParaRPr lang="en-US" sz="1200" b="0" i="0" kern="1200" dirty="0" smtClean="0">
-              <a:solidFill>
-                <a:schemeClr val="tx1"/>
-              </a:solidFill>
-              <a:effectLst/>
-              <a:latin typeface="+mn-lt"/>
-              <a:ea typeface="+mn-ea"/>
-              <a:cs typeface="+mn-cs"/>
-            </a:endParaRPr>
-          </a:p>
-          <a:p>
-            <a:r>
-              <a:rPr lang="en-US" sz="1200" b="0" i="0" kern="1200" dirty="0" smtClean="0">
-                <a:solidFill>
-                  <a:schemeClr val="tx1"/>
-                </a:solidFill>
-                <a:effectLst/>
-                <a:latin typeface="+mn-lt"/>
-                <a:ea typeface="+mn-ea"/>
-                <a:cs typeface="+mn-cs"/>
-              </a:rPr>
-              <a:t>	+</a:t>
-            </a:r>
-            <a:r>
-              <a:rPr lang="en-US" sz="1200" b="0" i="0" kern="1200" baseline="0" dirty="0" smtClean="0">
-                <a:solidFill>
-                  <a:schemeClr val="tx1"/>
-                </a:solidFill>
-                <a:effectLst/>
-                <a:latin typeface="+mn-lt"/>
-                <a:ea typeface="+mn-ea"/>
-                <a:cs typeface="+mn-cs"/>
-              </a:rPr>
-              <a:t> </a:t>
-            </a:r>
-            <a:r>
-              <a:rPr lang="vi-VN" sz="1200" b="0" i="0" kern="1200" dirty="0" smtClean="0">
-                <a:solidFill>
-                  <a:schemeClr val="tx1"/>
-                </a:solidFill>
-                <a:effectLst/>
-                <a:latin typeface="+mn-lt"/>
-                <a:ea typeface="+mn-ea"/>
-                <a:cs typeface="+mn-cs"/>
-              </a:rPr>
-              <a:t>cũng như tận dụng tối đa các tính năng khác của thiết bị di động như GPS, camera, danh sách liên lạc,… </a:t>
-            </a:r>
-            <a:endParaRPr lang="en-US" sz="1200" b="0" i="0" kern="1200" dirty="0" smtClean="0">
-              <a:solidFill>
-                <a:schemeClr val="tx1"/>
-              </a:solidFill>
-              <a:effectLst/>
-              <a:latin typeface="+mn-lt"/>
-              <a:ea typeface="+mn-ea"/>
-              <a:cs typeface="+mn-cs"/>
-            </a:endParaRPr>
-          </a:p>
-          <a:p>
-            <a:r>
-              <a:rPr lang="en-US" sz="1200" b="0" i="0" kern="1200" dirty="0" smtClean="0">
-                <a:solidFill>
-                  <a:schemeClr val="tx1"/>
-                </a:solidFill>
-                <a:effectLst/>
-                <a:latin typeface="+mn-lt"/>
-                <a:ea typeface="+mn-ea"/>
-                <a:cs typeface="+mn-cs"/>
-              </a:rPr>
-              <a:t>	+</a:t>
-            </a:r>
-            <a:r>
-              <a:rPr lang="en-US" sz="1200" b="0" i="0" kern="1200" baseline="0" dirty="0" smtClean="0">
-                <a:solidFill>
-                  <a:schemeClr val="tx1"/>
-                </a:solidFill>
-                <a:effectLst/>
-                <a:latin typeface="+mn-lt"/>
-                <a:ea typeface="+mn-ea"/>
-                <a:cs typeface="+mn-cs"/>
-              </a:rPr>
-              <a:t> </a:t>
-            </a:r>
-            <a:r>
-              <a:rPr lang="vi-VN" sz="1200" b="0" i="0" kern="1200" dirty="0" smtClean="0">
-                <a:solidFill>
-                  <a:schemeClr val="tx1"/>
-                </a:solidFill>
-                <a:effectLst/>
-                <a:latin typeface="+mn-lt"/>
-                <a:ea typeface="+mn-ea"/>
-                <a:cs typeface="+mn-cs"/>
-              </a:rPr>
-              <a:t>Bên cạnh đó, thời gian và chi phí dùng để tạo nên một ứng dụng </a:t>
-            </a:r>
-            <a:r>
-              <a:rPr lang="en-US" sz="1200" b="0" i="0" kern="1200" dirty="0" smtClean="0">
-                <a:solidFill>
-                  <a:schemeClr val="tx1"/>
-                </a:solidFill>
-                <a:effectLst/>
-                <a:latin typeface="+mn-lt"/>
-                <a:ea typeface="+mn-ea"/>
-                <a:cs typeface="+mn-cs"/>
-              </a:rPr>
-              <a:t>di</a:t>
-            </a:r>
-            <a:r>
-              <a:rPr lang="en-US" sz="1200" b="0" i="0" kern="1200" baseline="0" dirty="0" smtClean="0">
-                <a:solidFill>
-                  <a:schemeClr val="tx1"/>
-                </a:solidFill>
-                <a:effectLst/>
-                <a:latin typeface="+mn-lt"/>
-                <a:ea typeface="+mn-ea"/>
-                <a:cs typeface="+mn-cs"/>
-              </a:rPr>
-              <a:t> </a:t>
-            </a:r>
-            <a:r>
-              <a:rPr lang="en-US" sz="1200" b="0" i="0" kern="1200" baseline="0" dirty="0" err="1" smtClean="0">
-                <a:solidFill>
-                  <a:schemeClr val="tx1"/>
-                </a:solidFill>
-                <a:effectLst/>
-                <a:latin typeface="+mn-lt"/>
-                <a:ea typeface="+mn-ea"/>
-                <a:cs typeface="+mn-cs"/>
-              </a:rPr>
-              <a:t>động</a:t>
-            </a:r>
-            <a:r>
-              <a:rPr lang="vi-VN" sz="1200" b="0" i="0" kern="1200" dirty="0" smtClean="0">
-                <a:solidFill>
-                  <a:schemeClr val="tx1"/>
-                </a:solidFill>
-                <a:effectLst/>
-                <a:latin typeface="+mn-lt"/>
-                <a:ea typeface="+mn-ea"/>
-                <a:cs typeface="+mn-cs"/>
-              </a:rPr>
-              <a:t> cũng thấp hơn so với các ứng dụng di động thông thường.</a:t>
-            </a:r>
-            <a:endParaRPr lang="en-US" sz="1200" b="0" i="0" kern="1200" dirty="0" smtClean="0">
-              <a:solidFill>
-                <a:schemeClr val="tx1"/>
-              </a:solidFill>
-              <a:effectLst/>
-              <a:latin typeface="+mn-lt"/>
-              <a:ea typeface="+mn-ea"/>
-              <a:cs typeface="+mn-cs"/>
-            </a:endParaRPr>
-          </a:p>
-          <a:p>
-            <a:r>
-              <a:rPr lang="en-US" sz="1200" b="0" i="0" kern="1200" dirty="0" smtClean="0">
-                <a:solidFill>
-                  <a:schemeClr val="tx1"/>
-                </a:solidFill>
-                <a:effectLst/>
-                <a:latin typeface="+mn-lt"/>
-                <a:ea typeface="+mn-ea"/>
-                <a:cs typeface="+mn-cs"/>
-              </a:rPr>
-              <a:t>	+ </a:t>
-            </a:r>
-            <a:r>
-              <a:rPr lang="vi-VN" sz="1200" b="0" i="0" kern="1200" dirty="0" smtClean="0">
-                <a:solidFill>
-                  <a:schemeClr val="tx1"/>
-                </a:solidFill>
-                <a:effectLst/>
-                <a:latin typeface="+mn-lt"/>
-                <a:ea typeface="+mn-ea"/>
-                <a:cs typeface="+mn-cs"/>
-              </a:rPr>
-              <a:t>hiệu ứng chuyển động mượt mà và thiết kế đẹp</a:t>
-            </a:r>
-            <a:endParaRPr lang="en-US" sz="1200" b="0" i="0" kern="1200" dirty="0" smtClean="0">
-              <a:solidFill>
-                <a:schemeClr val="tx1"/>
-              </a:solidFill>
-              <a:effectLst/>
-              <a:latin typeface="+mn-lt"/>
-              <a:ea typeface="+mn-ea"/>
-              <a:cs typeface="+mn-cs"/>
-            </a:endParaRPr>
-          </a:p>
-          <a:p>
             <a:endParaRPr lang="en-US" sz="1200" b="0" i="0" kern="1200" dirty="0" smtClean="0">
               <a:solidFill>
                 <a:schemeClr val="tx1"/>
@@ -14490,7 +14012,7 @@
         <p:spPr>
           <a:xfrm>
             <a:off x="6527787" y="4979246"/>
-            <a:ext cx="1903957" cy="381000"/>
+            <a:ext cx="1903957" cy="511068"/>
           </a:xfrm>
           <a:prstGeom prst="roundRect">
             <a:avLst/>
@@ -14521,14 +14043,78 @@
           <a:p>
             <a:pPr algn="ctr"/>
             <a:r>
-              <a:rPr lang="en-US" b="1" smtClean="0">
+              <a:rPr lang="en-US" b="1" dirty="0" err="1" smtClean="0">
                 <a:solidFill>
                   <a:srgbClr val="000066"/>
                 </a:solidFill>
               </a:rPr>
-              <a:t>Điều chỉnh lịch</a:t>
-            </a:r>
-            <a:endParaRPr lang="en-US" b="1">
+              <a:t>Xử</a:t>
+            </a:r>
+            <a:r>
+              <a:rPr lang="en-US" b="1" dirty="0" smtClean="0">
+                <a:solidFill>
+                  <a:srgbClr val="000066"/>
+                </a:solidFill>
+              </a:rPr>
+              <a:t> </a:t>
+            </a:r>
+            <a:r>
+              <a:rPr lang="en-US" b="1" dirty="0" err="1" smtClean="0">
+                <a:solidFill>
+                  <a:srgbClr val="000066"/>
+                </a:solidFill>
+              </a:rPr>
+              <a:t>lý</a:t>
+            </a:r>
+            <a:r>
+              <a:rPr lang="en-US" b="1" dirty="0" smtClean="0">
+                <a:solidFill>
+                  <a:srgbClr val="000066"/>
+                </a:solidFill>
+              </a:rPr>
+              <a:t> </a:t>
+            </a:r>
+            <a:r>
+              <a:rPr lang="en-US" b="1" dirty="0" err="1" smtClean="0">
+                <a:solidFill>
+                  <a:srgbClr val="000066"/>
+                </a:solidFill>
+              </a:rPr>
+              <a:t>lịch</a:t>
+            </a:r>
+            <a:r>
+              <a:rPr lang="en-US" b="1" dirty="0" smtClean="0">
+                <a:solidFill>
+                  <a:srgbClr val="000066"/>
+                </a:solidFill>
+              </a:rPr>
+              <a:t> </a:t>
+            </a:r>
+            <a:r>
+              <a:rPr lang="en-US" b="1" dirty="0" err="1" smtClean="0">
+                <a:solidFill>
+                  <a:srgbClr val="000066"/>
+                </a:solidFill>
+              </a:rPr>
+              <a:t>chờ</a:t>
+            </a:r>
+            <a:r>
+              <a:rPr lang="en-US" b="1" dirty="0" smtClean="0">
+                <a:solidFill>
+                  <a:srgbClr val="000066"/>
+                </a:solidFill>
+              </a:rPr>
+              <a:t> </a:t>
+            </a:r>
+            <a:r>
+              <a:rPr lang="en-US" b="1" dirty="0" err="1" smtClean="0">
+                <a:solidFill>
+                  <a:srgbClr val="000066"/>
+                </a:solidFill>
+              </a:rPr>
+              <a:t>duyệt</a:t>
+            </a:r>
+            <a:endParaRPr lang="en-US" b="1" dirty="0">
               <a:solidFill>
                 <a:srgbClr val="000066"/>
               </a:solidFill>
@@ -14591,36 +14177,6 @@
           </a:p>
         </p:txBody>
       </p:sp>
-      <p:pic>
-        <p:nvPicPr>
-          <p:cNvPr id="40" name="Picture 39"/>
-          <p:cNvPicPr>
-            <a:picLocks noChangeAspect="1"/>
-          </p:cNvPicPr>
-          <p:nvPr/>
-        </p:nvPicPr>
-        <p:blipFill>
-          <a:blip r:embed="rId5">
-            <a:extLst>
-              <a:ext uri="{28A0092B-C50C-407E-A947-70E740481C1C}">
-                <a14:useLocalDpi xmlns:a14="http://schemas.microsoft.com/office/drawing/2010/main" val="0"/>
-              </a:ext>
-            </a:extLst>
-          </a:blip>
-          <a:stretch>
-            <a:fillRect/>
-          </a:stretch>
-        </p:blipFill>
-        <p:spPr>
-          <a:xfrm>
-            <a:off x="3886200" y="4191567"/>
-            <a:ext cx="1352290" cy="1352290"/>
-          </a:xfrm>
-          <a:prstGeom prst="rect">
-            <a:avLst/>
-          </a:prstGeom>
-        </p:spPr>
-      </p:pic>
       <p:sp>
         <p:nvSpPr>
           <p:cNvPr id="41" name="Rounded Rectangle 40"/>
@@ -14794,7 +14350,7 @@
         </p:nvSpPr>
         <p:spPr>
           <a:xfrm>
-            <a:off x="3680892" y="5543857"/>
+            <a:off x="6527787" y="5550863"/>
             <a:ext cx="1903957" cy="551147"/>
           </a:xfrm>
           <a:prstGeom prst="roundRect">
@@ -14826,14 +14382,86 @@
           <a:p>
             <a:pPr algn="ctr"/>
             <a:r>
-              <a:rPr lang="en-US" b="1" smtClean="0">
+              <a:rPr lang="en-US" b="1" dirty="0" err="1" smtClean="0">
                 <a:solidFill>
                   <a:srgbClr val="000066"/>
                 </a:solidFill>
               </a:rPr>
-              <a:t>Các chức năng quản lý </a:t>
-            </a:r>
-            <a:endParaRPr lang="en-US" b="1">
+              <a:t>Các</a:t>
+            </a:r>
+            <a:r>
+              <a:rPr lang="en-US" b="1" dirty="0" smtClean="0">
+                <a:solidFill>
+                  <a:srgbClr val="000066"/>
+                </a:solidFill>
+              </a:rPr>
+              <a:t> </a:t>
+            </a:r>
+            <a:r>
+              <a:rPr lang="en-US" b="1" dirty="0" err="1" smtClean="0">
+                <a:solidFill>
+                  <a:srgbClr val="000066"/>
+                </a:solidFill>
+              </a:rPr>
+              <a:t>chức</a:t>
+            </a:r>
+            <a:r>
+              <a:rPr lang="en-US" b="1" dirty="0" smtClean="0">
+                <a:solidFill>
+                  <a:srgbClr val="000066"/>
+                </a:solidFill>
+              </a:rPr>
+              <a:t> </a:t>
+            </a:r>
+            <a:r>
+              <a:rPr lang="en-US" b="1" dirty="0" err="1" smtClean="0">
+                <a:solidFill>
+                  <a:srgbClr val="000066"/>
+                </a:solidFill>
+              </a:rPr>
+              <a:t>năng</a:t>
+            </a:r>
+            <a:r>
+              <a:rPr lang="en-US" b="1" dirty="0" smtClean="0">
+                <a:solidFill>
+                  <a:srgbClr val="000066"/>
+                </a:solidFill>
+              </a:rPr>
+              <a:t> </a:t>
+            </a:r>
+            <a:r>
+              <a:rPr lang="en-US" b="1" dirty="0" err="1" smtClean="0">
+                <a:solidFill>
+                  <a:srgbClr val="000066"/>
+                </a:solidFill>
+              </a:rPr>
+              <a:t>quản</a:t>
+            </a:r>
+            <a:r>
+              <a:rPr lang="en-US" b="1" dirty="0" smtClean="0">
+                <a:solidFill>
+                  <a:srgbClr val="000066"/>
+                </a:solidFill>
+              </a:rPr>
+              <a:t> </a:t>
+            </a:r>
+            <a:r>
+              <a:rPr lang="en-US" b="1" dirty="0" err="1" smtClean="0">
+                <a:solidFill>
+                  <a:srgbClr val="000066"/>
+                </a:solidFill>
+              </a:rPr>
+              <a:t>lý</a:t>
+            </a:r>
+            <a:r>
+              <a:rPr lang="en-US" b="1" dirty="0" smtClean="0">
+                <a:solidFill>
+                  <a:srgbClr val="000066"/>
+                </a:solidFill>
+              </a:rPr>
+              <a:t> </a:t>
+            </a:r>
+            <a:endParaRPr lang="en-US" b="1" dirty="0">
               <a:solidFill>
                 <a:srgbClr val="000066"/>
               </a:solidFill>
@@ -14982,51 +14610,30 @@
           <a:lstStyle/>
           <a:p>
             <a:r>
-              <a:rPr lang="en-US" b="1" smtClean="0">
+              <a:rPr lang="en-US" b="1" dirty="0" err="1" smtClean="0">
                 <a:solidFill>
                   <a:srgbClr val="000066"/>
                 </a:solidFill>
               </a:rPr>
-              <a:t>Giảng viên</a:t>
-            </a:r>
-            <a:endParaRPr lang="en-US" b="1">
-              <a:solidFill>
-                <a:srgbClr val="000066"/>
-              </a:solidFill>
-            </a:endParaRPr>
-          </a:p>
-        </p:txBody>
-      </p:sp>
-      <p:sp>
-        <p:nvSpPr>
-          <p:cNvPr id="6" name="Rectangle 5"/>
-          <p:cNvSpPr/>
-          <p:nvPr/>
-        </p:nvSpPr>
-        <p:spPr>
-          <a:xfrm>
-            <a:off x="3479404" y="4245232"/>
-            <a:ext cx="902811" cy="369332"/>
-          </a:xfrm>
-          <a:prstGeom prst="rect">
-            <a:avLst/>
-          </a:prstGeom>
-        </p:spPr>
-        <p:txBody>
-          <a:bodyPr wrap="none">
-            <a:spAutoFit/>
-          </a:bodyPr>
-          <a:lstStyle/>
-          <a:p>
-            <a:r>
-              <a:rPr lang="en-US" b="1" smtClean="0">
+              <a:t>Giảng</a:t>
+            </a:r>
+            <a:r>
+              <a:rPr lang="en-US" b="1" dirty="0" smtClean="0">
                 <a:solidFill>
                   <a:srgbClr val="000066"/>
                 </a:solidFill>
               </a:rPr>
-              <a:t>Admin</a:t>
-            </a:r>
-            <a:endParaRPr lang="en-US" b="1">
+              <a:t> </a:t>
+            </a:r>
+            <a:r>
+              <a:rPr lang="en-US" b="1" dirty="0" err="1" smtClean="0">
+                <a:solidFill>
+                  <a:srgbClr val="000066"/>
+                </a:solidFill>
+              </a:rPr>
+              <a:t>viên</a:t>
+            </a:r>
+            <a:endParaRPr lang="en-US" b="1" dirty="0">
               <a:solidFill>
                 <a:srgbClr val="000066"/>
               </a:solidFill>
@@ -15071,18 +14678,205 @@
           </a:p>
         </p:txBody>
       </p:sp>
+      <p:pic>
+        <p:nvPicPr>
+          <p:cNvPr id="22" name="Picture 21"/>
+          <p:cNvPicPr>
+            <a:picLocks noChangeAspect="1"/>
+          </p:cNvPicPr>
+          <p:nvPr/>
+        </p:nvPicPr>
+        <p:blipFill>
+          <a:blip r:embed="rId4" cstate="print">
+            <a:extLst>
+              <a:ext uri="{28A0092B-C50C-407E-A947-70E740481C1C}">
+                <a14:useLocalDpi xmlns:a14="http://schemas.microsoft.com/office/drawing/2010/main" val="0"/>
+              </a:ext>
+            </a:extLst>
+          </a:blip>
+          <a:stretch>
+            <a:fillRect/>
+          </a:stretch>
+        </p:blipFill>
+        <p:spPr>
+          <a:xfrm>
+            <a:off x="4223844" y="4469983"/>
+            <a:ext cx="1200412" cy="1200412"/>
+          </a:xfrm>
+          <a:prstGeom prst="rect">
+            <a:avLst/>
+          </a:prstGeom>
+        </p:spPr>
+      </p:pic>
       <p:sp>
         <p:nvSpPr>
-          <p:cNvPr id="54" name="Down Arrow 53"/>
+          <p:cNvPr id="23" name="TextBox 22"/>
+          <p:cNvSpPr txBox="1"/>
+          <p:nvPr/>
+        </p:nvSpPr>
+        <p:spPr>
+          <a:xfrm>
+            <a:off x="4357353" y="4059247"/>
+            <a:ext cx="1028478" cy="369332"/>
+          </a:xfrm>
+          <a:prstGeom prst="rect">
+            <a:avLst/>
+          </a:prstGeom>
+          <a:noFill/>
+        </p:spPr>
+        <p:txBody>
+          <a:bodyPr wrap="square" rtlCol="0">
+            <a:spAutoFit/>
+          </a:bodyPr>
+          <a:lstStyle/>
+          <a:p>
+            <a:r>
+              <a:rPr lang="en-US" b="1" dirty="0" err="1" smtClean="0">
+                <a:solidFill>
+                  <a:srgbClr val="000066"/>
+                </a:solidFill>
+              </a:rPr>
+              <a:t>Khách</a:t>
+            </a:r>
+            <a:endParaRPr lang="en-US" b="1" dirty="0">
+              <a:solidFill>
+                <a:srgbClr val="000066"/>
+              </a:solidFill>
+            </a:endParaRPr>
+          </a:p>
+        </p:txBody>
+      </p:sp>
+      <p:sp>
+        <p:nvSpPr>
+          <p:cNvPr id="24" name="Rounded Rectangle 23"/>
           <p:cNvSpPr/>
           <p:nvPr/>
         </p:nvSpPr>
         <p:spPr>
           <a:xfrm>
-            <a:off x="4349558" y="3585838"/>
-            <a:ext cx="747670" cy="507992"/>
+            <a:off x="3767688" y="5753203"/>
+            <a:ext cx="2112724" cy="527671"/>
           </a:xfrm>
-          <a:prstGeom prst="downArrow">
+          <a:prstGeom prst="roundRect">
+            <a:avLst/>
+          </a:prstGeom>
+          <a:solidFill>
+            <a:srgbClr val="FCFAA4"/>
+          </a:solidFill>
+        </p:spPr>
+        <p:style>
+          <a:lnRef idx="2">
+            <a:schemeClr val="accent1">
+              <a:shade val="50000"/>
+            </a:schemeClr>
+          </a:lnRef>
+          <a:fillRef idx="1">
+            <a:schemeClr val="accent1"/>
+          </a:fillRef>
+          <a:effectRef idx="0">
+            <a:schemeClr val="accent1"/>
+          </a:effectRef>
+          <a:fontRef idx="minor">
+            <a:schemeClr val="lt1"/>
+          </a:fontRef>
+        </p:style>
+        <p:txBody>
+          <a:bodyPr rtlCol="0" anchor="ctr"/>
+          <a:lstStyle/>
+          <a:p>
+            <a:pPr algn="ctr"/>
+            <a:r>
+              <a:rPr lang="en-US" b="1" dirty="0" err="1" smtClean="0">
+                <a:solidFill>
+                  <a:srgbClr val="000066"/>
+                </a:solidFill>
+              </a:rPr>
+              <a:t>Xem</a:t>
+            </a:r>
+            <a:r>
+              <a:rPr lang="en-US" b="1" dirty="0" smtClean="0">
+                <a:solidFill>
+                  <a:srgbClr val="000066"/>
+                </a:solidFill>
+              </a:rPr>
+              <a:t> </a:t>
+            </a:r>
+            <a:r>
+              <a:rPr lang="en-US" b="1" dirty="0" err="1" smtClean="0">
+                <a:solidFill>
+                  <a:srgbClr val="000066"/>
+                </a:solidFill>
+              </a:rPr>
+              <a:t>lịch</a:t>
+            </a:r>
+            <a:r>
+              <a:rPr lang="en-US" b="1" dirty="0" smtClean="0">
+                <a:solidFill>
+                  <a:srgbClr val="000066"/>
+                </a:solidFill>
+              </a:rPr>
+              <a:t> </a:t>
+            </a:r>
+            <a:r>
+              <a:rPr lang="en-US" b="1" dirty="0" err="1" smtClean="0">
+                <a:solidFill>
+                  <a:srgbClr val="000066"/>
+                </a:solidFill>
+              </a:rPr>
+              <a:t>dạy</a:t>
+            </a:r>
+            <a:r>
+              <a:rPr lang="en-US" b="1" dirty="0" smtClean="0">
+                <a:solidFill>
+                  <a:srgbClr val="000066"/>
+                </a:solidFill>
+              </a:rPr>
+              <a:t> </a:t>
+            </a:r>
+            <a:r>
+              <a:rPr lang="en-US" b="1" dirty="0" err="1" smtClean="0">
+                <a:solidFill>
+                  <a:srgbClr val="000066"/>
+                </a:solidFill>
+              </a:rPr>
+              <a:t>toàn</a:t>
+            </a:r>
+            <a:r>
+              <a:rPr lang="en-US" b="1" dirty="0" smtClean="0">
+                <a:solidFill>
+                  <a:srgbClr val="000066"/>
+                </a:solidFill>
+              </a:rPr>
+              <a:t> </a:t>
+            </a:r>
+            <a:r>
+              <a:rPr lang="en-US" b="1" dirty="0" err="1" smtClean="0">
+                <a:solidFill>
+                  <a:srgbClr val="000066"/>
+                </a:solidFill>
+              </a:rPr>
+              <a:t>khoa</a:t>
+            </a:r>
+            <a:endParaRPr lang="en-US" b="1" dirty="0">
+              <a:solidFill>
+                <a:srgbClr val="000066"/>
+              </a:solidFill>
+            </a:endParaRPr>
+          </a:p>
+        </p:txBody>
+      </p:sp>
+      <p:sp>
+        <p:nvSpPr>
+          <p:cNvPr id="25" name="Left Arrow 24"/>
+          <p:cNvSpPr/>
+          <p:nvPr/>
+        </p:nvSpPr>
+        <p:spPr>
+          <a:xfrm rot="16200000">
+            <a:off x="4492162" y="3486287"/>
+            <a:ext cx="663775" cy="497681"/>
+          </a:xfrm>
+          <a:prstGeom prst="leftArrow">
             <a:avLst/>
           </a:prstGeom>
         </p:spPr>
@@ -15107,7 +14901,11 @@
           <a:lstStyle/>
           <a:p>
             <a:pPr algn="ctr"/>
-            <a:endParaRPr lang="en-US"/>
+            <a:endParaRPr lang="en-US">
+              <a:solidFill>
+                <a:srgbClr val="000066"/>
+              </a:solidFill>
+            </a:endParaRPr>
           </a:p>
         </p:txBody>
       </p:sp>
@@ -16180,7 +15978,7 @@
                             </p:stCondLst>
                             <p:childTnLst>
                               <p:par>
-                                <p:cTn id="83" presetID="16" presetClass="entr" presetSubtype="21" fill="hold" grpId="0" nodeType="clickEffect">
+                                <p:cTn id="83" presetID="42" presetClass="entr" presetSubtype="0" fill="hold" grpId="0" nodeType="clickEffect">
                                   <p:stCondLst>
                                     <p:cond delay="0"/>
                                   </p:stCondLst>
@@ -16188,129 +15986,6 @@
                                     <p:set>
                                       <p:cBhvr>
                                         <p:cTn id="84" dur="1" fill="hold">
-                                          <p:stCondLst>
-                                            <p:cond delay="0"/>
-                                          </p:stCondLst>
-                                        </p:cTn>
-                                        <p:tgtEl>
-                                          <p:spTgt spid="6"/>
-                                        </p:tgtEl>
-                                        <p:attrNameLst>
-                                          <p:attrName>style.visibility</p:attrName>
-                                        </p:attrNameLst>
-                                      </p:cBhvr>
-                                      <p:to>
-                                        <p:strVal val="visible"/>
-                                      </p:to>
-                                    </p:set>
-                                    <p:animEffect transition="in" filter="barn(inVertical)">
-                                      <p:cBhvr>
-                                        <p:cTn id="85" dur="500"/>
-                                        <p:tgtEl>
-                                          <p:spTgt spid="6"/>
-                                        </p:tgtEl>
-                                      </p:cBhvr>
-                                    </p:animEffect>
-                                  </p:childTnLst>
-                                </p:cTn>
-                              </p:par>
-                              <p:par>
-                                <p:cTn id="86" presetID="16" presetClass="entr" presetSubtype="21" fill="hold" grpId="0" nodeType="withEffect">
-                                  <p:stCondLst>
-                                    <p:cond delay="0"/>
-                                  </p:stCondLst>
-                                  <p:childTnLst>
-                                    <p:set>
-                                      <p:cBhvr>
-                                        <p:cTn id="87" dur="1" fill="hold">
-                                          <p:stCondLst>
-                                            <p:cond delay="0"/>
-                                          </p:stCondLst>
-                                        </p:cTn>
-                                        <p:tgtEl>
-                                          <p:spTgt spid="54"/>
-                                        </p:tgtEl>
-                                        <p:attrNameLst>
-                                          <p:attrName>style.visibility</p:attrName>
-                                        </p:attrNameLst>
-                                      </p:cBhvr>
-                                      <p:to>
-                                        <p:strVal val="visible"/>
-                                      </p:to>
-                                    </p:set>
-                                    <p:animEffect transition="in" filter="barn(inVertical)">
-                                      <p:cBhvr>
-                                        <p:cTn id="88" dur="500"/>
-                                        <p:tgtEl>
-                                          <p:spTgt spid="54"/>
-                                        </p:tgtEl>
-                                      </p:cBhvr>
-                                    </p:animEffect>
-                                  </p:childTnLst>
-                                </p:cTn>
-                              </p:par>
-                              <p:par>
-                                <p:cTn id="89" presetID="16" presetClass="entr" presetSubtype="21" fill="hold" nodeType="withEffect">
-                                  <p:stCondLst>
-                                    <p:cond delay="0"/>
-                                  </p:stCondLst>
-                                  <p:childTnLst>
-                                    <p:set>
-                                      <p:cBhvr>
-                                        <p:cTn id="90" dur="1" fill="hold">
-                                          <p:stCondLst>
-                                            <p:cond delay="0"/>
-                                          </p:stCondLst>
-                                        </p:cTn>
-                                        <p:tgtEl>
-                                          <p:spTgt spid="40"/>
-                                        </p:tgtEl>
-                                        <p:attrNameLst>
-                                          <p:attrName>style.visibility</p:attrName>
-                                        </p:attrNameLst>
-                                      </p:cBhvr>
-                                      <p:to>
-                                        <p:strVal val="visible"/>
-                                      </p:to>
-                                    </p:set>
-                                    <p:animEffect transition="in" filter="barn(inVertical)">
-                                      <p:cBhvr>
-                                        <p:cTn id="91" dur="500"/>
-                                        <p:tgtEl>
-                                          <p:spTgt spid="40"/>
-                                        </p:tgtEl>
-                                      </p:cBhvr>
-                                    </p:animEffect>
-                                  </p:childTnLst>
-                                </p:cTn>
-                              </p:par>
-                            </p:childTnLst>
-                          </p:cTn>
-                        </p:par>
-                      </p:childTnLst>
-                    </p:cTn>
-                  </p:par>
-                  <p:par>
-                    <p:cTn id="92" fill="hold">
-                      <p:stCondLst>
-                        <p:cond delay="indefinite"/>
-                      </p:stCondLst>
-                      <p:childTnLst>
-                        <p:par>
-                          <p:cTn id="93" fill="hold">
-                            <p:stCondLst>
-                              <p:cond delay="0"/>
-                            </p:stCondLst>
-                            <p:childTnLst>
-                              <p:par>
-                                <p:cTn id="94" presetID="42" presetClass="entr" presetSubtype="0" fill="hold" grpId="0" nodeType="clickEffect">
-                                  <p:stCondLst>
-                                    <p:cond delay="0"/>
-                                  </p:stCondLst>
-                                  <p:childTnLst>
-                                    <p:set>
-                                      <p:cBhvr>
-                                        <p:cTn id="95" dur="1" fill="hold">
                                           <p:stCondLst>
                                             <p:cond delay="0"/>
                                           </p:stCondLst>
@@ -16328,7 +16003,7 @@
                                     </p:set>
                                     <p:animEffect transition="in" filter="fade">
                                       <p:cBhvr>
-                                        <p:cTn id="96" dur="1000"/>
+                                        <p:cTn id="85" dur="1000"/>
                                         <p:tgtEl>
                                           <p:spTgt spid="44"/>
                                         </p:tgtEl>
@@ -16336,7 +16011,7 @@
                                     </p:animEffect>
                                     <p:anim calcmode="lin" valueType="num">
                                       <p:cBhvr>
-                                        <p:cTn id="97" dur="1000" fill="hold"/>
+                                        <p:cTn id="86" dur="1000" fill="hold"/>
                                         <p:tgtEl>
                                           <p:spTgt spid="44"/>
                                         </p:tgtEl>
@@ -16359,7 +16034,7 @@
                                     </p:anim>
                                     <p:anim calcmode="lin" valueType="num">
                                       <p:cBhvr>
-                                        <p:cTn id="98" dur="1000" fill="hold"/>
+                                        <p:cTn id="87" dur="1000" fill="hold"/>
                                         <p:tgtEl>
                                           <p:spTgt spid="44"/>
                                         </p:tgtEl>
@@ -16380,6 +16055,228 @@
                                         </p:tav>
                                       </p:tavLst>
                                     </p:anim>
+                                  </p:childTnLst>
+                                </p:cTn>
+                              </p:par>
+                              <p:par>
+                                <p:cTn id="88" presetID="16" presetClass="entr" presetSubtype="21" fill="hold" nodeType="withEffect">
+                                  <p:stCondLst>
+                                    <p:cond delay="0"/>
+                                  </p:stCondLst>
+                                  <p:childTnLst>
+                                    <p:set>
+                                      <p:cBhvr>
+                                        <p:cTn id="89" dur="1" fill="hold">
+                                          <p:stCondLst>
+                                            <p:cond delay="0"/>
+                                          </p:stCondLst>
+                                        </p:cTn>
+                                        <p:tgtEl>
+                                          <p:spTgt spid="22"/>
+                                        </p:tgtEl>
+                                        <p:attrNameLst>
+                                          <p:attrName>style.visibility</p:attrName>
+                                        </p:attrNameLst>
+                                      </p:cBhvr>
+                                      <p:to>
+                                        <p:strVal val="visible"/>
+                                      </p:to>
+                                    </p:set>
+                                    <p:animEffect transition="in" filter="barn(inVertical)">
+                                      <p:cBhvr>
+                                        <p:cTn id="90" dur="500"/>
+                                        <p:tgtEl>
+                                          <p:spTgt spid="22"/>
+                                        </p:tgtEl>
+                                      </p:cBhvr>
+                                    </p:animEffect>
+                                  </p:childTnLst>
+                                </p:cTn>
+                              </p:par>
+                              <p:par>
+                                <p:cTn id="91" presetID="16" presetClass="entr" presetSubtype="21" fill="hold" grpId="0" nodeType="withEffect">
+                                  <p:stCondLst>
+                                    <p:cond delay="0"/>
+                                  </p:stCondLst>
+                                  <p:childTnLst>
+                                    <p:set>
+                                      <p:cBhvr>
+                                        <p:cTn id="92" dur="1" fill="hold">
+                                          <p:stCondLst>
+                                            <p:cond delay="0"/>
+                                          </p:stCondLst>
+                                        </p:cTn>
+                                        <p:tgtEl>
+                                          <p:spTgt spid="23"/>
+                                        </p:tgtEl>
+                                        <p:attrNameLst>
+                                          <p:attrName>style.visibility</p:attrName>
+                                        </p:attrNameLst>
+                                      </p:cBhvr>
+                                      <p:to>
+                                        <p:strVal val="visible"/>
+                                      </p:to>
+                                    </p:set>
+                                    <p:animEffect transition="in" filter="barn(inVertical)">
+                                      <p:cBhvr>
+                                        <p:cTn id="93" dur="500"/>
+                                        <p:tgtEl>
+                                          <p:spTgt spid="23"/>
+                                        </p:tgtEl>
+                                      </p:cBhvr>
+                                    </p:animEffect>
+                                  </p:childTnLst>
+                                </p:cTn>
+                              </p:par>
+                            </p:childTnLst>
+                          </p:cTn>
+                        </p:par>
+                      </p:childTnLst>
+                    </p:cTn>
+                  </p:par>
+                  <p:par>
+                    <p:cTn id="94" fill="hold">
+                      <p:stCondLst>
+                        <p:cond delay="indefinite"/>
+                      </p:stCondLst>
+                      <p:childTnLst>
+                        <p:par>
+                          <p:cTn id="95" fill="hold">
+                            <p:stCondLst>
+                              <p:cond delay="0"/>
+                            </p:stCondLst>
+                            <p:childTnLst>
+                              <p:par>
+                                <p:cTn id="96" presetID="42" presetClass="entr" presetSubtype="0" fill="hold" grpId="0" nodeType="clickEffect">
+                                  <p:stCondLst>
+                                    <p:cond delay="0"/>
+                                  </p:stCondLst>
+                                  <p:childTnLst>
+                                    <p:set>
+                                      <p:cBhvr>
+                                        <p:cTn id="97" dur="1" fill="hold">
+                                          <p:stCondLst>
+                                            <p:cond delay="0"/>
+                                          </p:stCondLst>
+                                        </p:cTn>
+                                        <p:tgtEl>
+                                          <p:spTgt spid="24"/>
+                                        </p:tgtEl>
+                                        <p:attrNameLst>
+                                          <p:attrName>style.visibility</p:attrName>
+                                        </p:attrNameLst>
+                                      </p:cBhvr>
+                                      <p:to>
+                                        <p:strVal val="visible"/>
+                                      </p:to>
+                                    </p:set>
+                                    <p:animEffect transition="in" filter="fade">
+                                      <p:cBhvr>
+                                        <p:cTn id="98" dur="1000"/>
+                                        <p:tgtEl>
+                                          <p:spTgt spid="24"/>
+                                        </p:tgtEl>
+                                      </p:cBhvr>
+                                    </p:animEffect>
+                                    <p:anim calcmode="lin" valueType="num">
+                                      <p:cBhvr>
+                                        <p:cTn id="99" dur="1000" fill="hold"/>
+                                        <p:tgtEl>
+                                          <p:spTgt spid="24"/>
+                                        </p:tgtEl>
+                                        <p:attrNameLst>
+                                          <p:attrName>ppt_x</p:attrName>
+                                        </p:attrNameLst>
+                                      </p:cBhvr>
+                                      <p:tavLst>
+                                        <p:tav tm="0">
+                                          <p:val>
+                                            <p:strVal val="#ppt_x"/>
+                                          </p:val>
+                                        </p:tav>
+                                        <p:tav tm="100000">
+                                          <p:val>
+                                            <p:strVal val="#ppt_x"/>
+                                          </p:val>
+                                        </p:tav>
+                                      </p:tavLst>
+                                    </p:anim>
+                                    <p:anim calcmode="lin" valueType="num">
+                                      <p:cBhvr>
+                                        <p:cTn id="100" dur="1000" fill="hold"/>
+                                        <p:tgtEl>
+                                          <p:spTgt spid="24"/>
+                                        </p:tgtEl>
+                                        <p:attrNameLst>
+                                          <p:attrName>ppt_y</p:attrName>
+                                        </p:attrNameLst>
+                                      </p:cBhvr>
+                                      <p:tavLst>
+                                        <p:tav tm="0">
+                                          <p:val>
+                                            <p:strVal val="#ppt_y+.1"/>
+                                          </p:val>
+                                        </p:tav>
+                                        <p:tav tm="100000">
+                                          <p:val>
+                                            <p:strVal val="#ppt_y"/>
+                                          </p:val>
+                                        </p:tav>
+                                      </p:tavLst>
+                                    </p:anim>
+                                  </p:childTnLst>
+                                </p:cTn>
+                              </p:par>
+                            </p:childTnLst>
+                          </p:cTn>
+                        </p:par>
+                      </p:childTnLst>
+                    </p:cTn>
+                  </p:par>
+                  <p:par>
+                    <p:cTn id="101" fill="hold">
+                      <p:stCondLst>
+                        <p:cond delay="indefinite"/>
+                      </p:stCondLst>
+                      <p:childTnLst>
+                        <p:par>
+                          <p:cTn id="102" fill="hold">
+                            <p:stCondLst>
+                              <p:cond delay="0"/>
+                            </p:stCondLst>
+                            <p:childTnLst>
+                              <p:par>
+                                <p:cTn id="103" presetID="16" presetClass="entr" presetSubtype="21" fill="hold" grpId="0" nodeType="clickEffect">
+                                  <p:stCondLst>
+                                    <p:cond delay="0"/>
+                                  </p:stCondLst>
+                                  <p:childTnLst>
+                                    <p:set>
+                                      <p:cBhvr>
+                                        <p:cTn id="104" dur="1" fill="hold">
+                                          <p:stCondLst>
+                                            <p:cond delay="0"/>
+                                          </p:stCondLst>
+                                        </p:cTn>
+                                        <p:tgtEl>
+                                          <p:spTgt spid="25"/>
+                                        </p:tgtEl>
+                                        <p:attrNameLst>
+                                          <p:attrName>style.visibility</p:attrName>
+                                        </p:attrNameLst>
+                                      </p:cBhvr>
+                                      <p:to>
+                                        <p:strVal val="visible"/>
+                                      </p:to>
+                                    </p:set>
+                                    <p:animEffect transition="in" filter="barn(inVertical)">
+                                      <p:cBhvr>
+                                        <p:cTn id="105" dur="500"/>
+                                        <p:tgtEl>
+                                          <p:spTgt spid="25"/>
+                                        </p:tgtEl>
+                                      </p:cBhvr>
+                                    </p:animEffect>
                                   </p:childTnLst>
                                 </p:cTn>
                               </p:par>
@@ -16422,9 +16319,10 @@
       <p:bldP spid="45" grpId="0" animBg="1"/>
       <p:bldP spid="46" grpId="0" animBg="1"/>
       <p:bldP spid="5" grpId="0"/>
-      <p:bldP spid="6" grpId="0"/>
       <p:bldP spid="53" grpId="0"/>
-      <p:bldP spid="54" grpId="0" animBg="1"/>
+      <p:bldP spid="23" grpId="0"/>
+      <p:bldP spid="24" grpId="0" animBg="1"/>
+      <p:bldP spid="25" grpId="0" animBg="1"/>
     </p:bldLst>
   </p:timing>
 </p:sld>
@@ -22637,11 +22535,7 @@
             </a:r>
             <a:r>
               <a:rPr lang="en-US" sz="2400" b="0" dirty="0" smtClean="0"/>
-              <a:t>,..</a:t>
-            </a:r>
-            <a:r>
-              <a:rPr lang="en-US" sz="2400" b="0" dirty="0" smtClean="0"/>
-              <a:t> </a:t>
+              <a:t>,.. </a:t>
             </a:r>
             <a:endParaRPr lang="en-US" sz="2400" b="0" dirty="0"/>
           </a:p>
@@ -26037,17 +25931,8 @@
               <a:rPr lang="en-US" sz="2900" dirty="0" smtClean="0">
                 <a:latin typeface="+mn-lt"/>
               </a:rPr>
-              <a:t> CSDL MySQL, </a:t>
-            </a:r>
-            <a:r>
-              <a:rPr lang="en-US" sz="2900" dirty="0" smtClean="0">
-                <a:latin typeface="+mn-lt"/>
-              </a:rPr>
-              <a:t>Apache Tomcat</a:t>
-            </a:r>
-            <a:endParaRPr lang="en-US" sz="2900" dirty="0" smtClean="0">
-              <a:latin typeface="+mn-lt"/>
-            </a:endParaRPr>
+              <a:t> CSDL MySQL, Apache Tomcat</a:t>
+            </a:r>
           </a:p>
           <a:p>
             <a:pPr lvl="1" algn="just">

</xml_diff>